<commit_message>
added implementation and design to presentation
</commit_message>
<xml_diff>
--- a/assets/Climate - Water Consumption Calendar.pptx
+++ b/assets/Climate - Water Consumption Calendar.pptx
@@ -7,8 +7,9 @@
   <p:sldIdLst>
     <p:sldId id="256" r:id="rId2"/>
     <p:sldId id="257" r:id="rId3"/>
-    <p:sldId id="258" r:id="rId4"/>
-    <p:sldId id="259" r:id="rId5"/>
+    <p:sldId id="261" r:id="rId4"/>
+    <p:sldId id="260" r:id="rId5"/>
+    <p:sldId id="259" r:id="rId6"/>
   </p:sldIdLst>
   <p:sldSz cx="12192000" cy="6858000"/>
   <p:notesSz cx="6858000" cy="9144000"/>
@@ -118,6 +119,7 @@
 <file path=ppt/revisionInfo.xml><?xml version="1.0" encoding="utf-8"?>
 <p1510:revInfo xmlns:a="http://schemas.openxmlformats.org/drawingml/2006/main" xmlns:r="http://schemas.openxmlformats.org/officeDocument/2006/relationships" xmlns:p1510="http://schemas.microsoft.com/office/powerpoint/2015/10/main">
   <p1510:revLst>
+    <p1510:client id="{3E6A00EA-F732-4370-B744-FDEAE37D42D4}" v="7" dt="2021-04-10T19:24:15.745"/>
     <p1510:client id="{73497908-12DC-4099-8029-8185DDE862F4}" v="2" dt="2021-04-10T19:10:59.015"/>
   </p1510:revLst>
 </p1510:revInfo>
@@ -144,6 +146,124 @@
             <pc:docMk/>
             <pc:sldMk cId="847145450" sldId="257"/>
             <ac:picMk id="1026" creationId="{85A32C76-F264-4706-9139-EF00D17C6843}"/>
+          </ac:picMkLst>
+        </pc:picChg>
+      </pc:sldChg>
+    </pc:docChg>
+  </pc:docChgLst>
+  <pc:docChgLst>
+    <pc:chgData name="Scarfy Muffin" userId="4c47e4a4a799b781" providerId="LiveId" clId="{3E6A00EA-F732-4370-B744-FDEAE37D42D4}"/>
+    <pc:docChg chg="undo custSel addSld delSld modSld sldOrd">
+      <pc:chgData name="Scarfy Muffin" userId="4c47e4a4a799b781" providerId="LiveId" clId="{3E6A00EA-F732-4370-B744-FDEAE37D42D4}" dt="2021-04-10T19:24:26.275" v="720" actId="1076"/>
+      <pc:docMkLst>
+        <pc:docMk/>
+      </pc:docMkLst>
+      <pc:sldChg chg="modSp del mod">
+        <pc:chgData name="Scarfy Muffin" userId="4c47e4a4a799b781" providerId="LiveId" clId="{3E6A00EA-F732-4370-B744-FDEAE37D42D4}" dt="2021-04-10T19:20:35.023" v="694" actId="2696"/>
+        <pc:sldMkLst>
+          <pc:docMk/>
+          <pc:sldMk cId="1700516614" sldId="258"/>
+        </pc:sldMkLst>
+        <pc:spChg chg="mod">
+          <ac:chgData name="Scarfy Muffin" userId="4c47e4a4a799b781" providerId="LiveId" clId="{3E6A00EA-F732-4370-B744-FDEAE37D42D4}" dt="2021-04-10T19:14:36.787" v="76" actId="20577"/>
+          <ac:spMkLst>
+            <pc:docMk/>
+            <pc:sldMk cId="1700516614" sldId="258"/>
+            <ac:spMk id="2" creationId="{4F0E9950-DDFD-498D-B64F-29F22FFC6EDF}"/>
+          </ac:spMkLst>
+        </pc:spChg>
+        <pc:spChg chg="mod">
+          <ac:chgData name="Scarfy Muffin" userId="4c47e4a4a799b781" providerId="LiveId" clId="{3E6A00EA-F732-4370-B744-FDEAE37D42D4}" dt="2021-04-10T19:20:02.821" v="689" actId="20577"/>
+          <ac:spMkLst>
+            <pc:docMk/>
+            <pc:sldMk cId="1700516614" sldId="258"/>
+            <ac:spMk id="3" creationId="{9CCA3830-8BA5-4A9E-9A8F-58D93F9969BC}"/>
+          </ac:spMkLst>
+        </pc:spChg>
+      </pc:sldChg>
+      <pc:sldChg chg="addSp delSp modSp new mod">
+        <pc:chgData name="Scarfy Muffin" userId="4c47e4a4a799b781" providerId="LiveId" clId="{3E6A00EA-F732-4370-B744-FDEAE37D42D4}" dt="2021-04-10T19:17:36.158" v="257" actId="20577"/>
+        <pc:sldMkLst>
+          <pc:docMk/>
+          <pc:sldMk cId="980565988" sldId="260"/>
+        </pc:sldMkLst>
+        <pc:spChg chg="mod">
+          <ac:chgData name="Scarfy Muffin" userId="4c47e4a4a799b781" providerId="LiveId" clId="{3E6A00EA-F732-4370-B744-FDEAE37D42D4}" dt="2021-04-10T19:15:26.253" v="83"/>
+          <ac:spMkLst>
+            <pc:docMk/>
+            <pc:sldMk cId="980565988" sldId="260"/>
+            <ac:spMk id="2" creationId="{6ACE79EA-35B1-4D54-B1D0-761AFA3569E8}"/>
+          </ac:spMkLst>
+        </pc:spChg>
+        <pc:spChg chg="mod">
+          <ac:chgData name="Scarfy Muffin" userId="4c47e4a4a799b781" providerId="LiveId" clId="{3E6A00EA-F732-4370-B744-FDEAE37D42D4}" dt="2021-04-10T19:17:36.158" v="257" actId="20577"/>
+          <ac:spMkLst>
+            <pc:docMk/>
+            <pc:sldMk cId="980565988" sldId="260"/>
+            <ac:spMk id="3" creationId="{3C07D08A-9281-44CD-8A5B-84CCEE0BAFD9}"/>
+          </ac:spMkLst>
+        </pc:spChg>
+        <pc:spChg chg="del mod">
+          <ac:chgData name="Scarfy Muffin" userId="4c47e4a4a799b781" providerId="LiveId" clId="{3E6A00EA-F732-4370-B744-FDEAE37D42D4}" dt="2021-04-10T19:16:16.142" v="92" actId="931"/>
+          <ac:spMkLst>
+            <pc:docMk/>
+            <pc:sldMk cId="980565988" sldId="260"/>
+            <ac:spMk id="4" creationId="{3C9B49D2-EC2A-43F2-8D59-5592BEA64243}"/>
+          </ac:spMkLst>
+        </pc:spChg>
+        <pc:picChg chg="add mod">
+          <ac:chgData name="Scarfy Muffin" userId="4c47e4a4a799b781" providerId="LiveId" clId="{3E6A00EA-F732-4370-B744-FDEAE37D42D4}" dt="2021-04-10T19:16:18.141" v="94" actId="962"/>
+          <ac:picMkLst>
+            <pc:docMk/>
+            <pc:sldMk cId="980565988" sldId="260"/>
+            <ac:picMk id="6" creationId="{4B8373A0-B79C-4951-913B-CDF313F83752}"/>
+          </ac:picMkLst>
+        </pc:picChg>
+      </pc:sldChg>
+      <pc:sldChg chg="addSp modSp add mod ord">
+        <pc:chgData name="Scarfy Muffin" userId="4c47e4a4a799b781" providerId="LiveId" clId="{3E6A00EA-F732-4370-B744-FDEAE37D42D4}" dt="2021-04-10T19:24:26.275" v="720" actId="1076"/>
+        <pc:sldMkLst>
+          <pc:docMk/>
+          <pc:sldMk cId="2517951660" sldId="261"/>
+        </pc:sldMkLst>
+        <pc:spChg chg="mod">
+          <ac:chgData name="Scarfy Muffin" userId="4c47e4a4a799b781" providerId="LiveId" clId="{3E6A00EA-F732-4370-B744-FDEAE37D42D4}" dt="2021-04-10T19:20:52.566" v="704" actId="20577"/>
+          <ac:spMkLst>
+            <pc:docMk/>
+            <pc:sldMk cId="2517951660" sldId="261"/>
+            <ac:spMk id="2" creationId="{6ACE79EA-35B1-4D54-B1D0-761AFA3569E8}"/>
+          </ac:spMkLst>
+        </pc:spChg>
+        <pc:spChg chg="mod">
+          <ac:chgData name="Scarfy Muffin" userId="4c47e4a4a799b781" providerId="LiveId" clId="{3E6A00EA-F732-4370-B744-FDEAE37D42D4}" dt="2021-04-10T19:20:31.377" v="693"/>
+          <ac:spMkLst>
+            <pc:docMk/>
+            <pc:sldMk cId="2517951660" sldId="261"/>
+            <ac:spMk id="3" creationId="{3C07D08A-9281-44CD-8A5B-84CCEE0BAFD9}"/>
+          </ac:spMkLst>
+        </pc:spChg>
+        <pc:picChg chg="add mod">
+          <ac:chgData name="Scarfy Muffin" userId="4c47e4a4a799b781" providerId="LiveId" clId="{3E6A00EA-F732-4370-B744-FDEAE37D42D4}" dt="2021-04-10T19:24:09.585" v="715" actId="1076"/>
+          <ac:picMkLst>
+            <pc:docMk/>
+            <pc:sldMk cId="2517951660" sldId="261"/>
+            <ac:picMk id="5" creationId="{442F7304-898A-442E-92C5-D8DDF054CEA4}"/>
+          </ac:picMkLst>
+        </pc:picChg>
+        <pc:picChg chg="mod">
+          <ac:chgData name="Scarfy Muffin" userId="4c47e4a4a799b781" providerId="LiveId" clId="{3E6A00EA-F732-4370-B744-FDEAE37D42D4}" dt="2021-04-10T19:24:07.603" v="714" actId="1076"/>
+          <ac:picMkLst>
+            <pc:docMk/>
+            <pc:sldMk cId="2517951660" sldId="261"/>
+            <ac:picMk id="6" creationId="{4B8373A0-B79C-4951-913B-CDF313F83752}"/>
+          </ac:picMkLst>
+        </pc:picChg>
+        <pc:picChg chg="add mod">
+          <ac:chgData name="Scarfy Muffin" userId="4c47e4a4a799b781" providerId="LiveId" clId="{3E6A00EA-F732-4370-B744-FDEAE37D42D4}" dt="2021-04-10T19:24:26.275" v="720" actId="1076"/>
+          <ac:picMkLst>
+            <pc:docMk/>
+            <pc:sldMk cId="2517951660" sldId="261"/>
+            <ac:picMk id="8" creationId="{294DE0BA-03BD-4809-9E7A-FCD136C16241}"/>
           </ac:picMkLst>
         </pc:picChg>
       </pc:sldChg>
@@ -6293,7 +6413,7 @@
           <p:cNvPr id="2" name="Title 1">
             <a:extLst>
               <a:ext uri="{FF2B5EF4-FFF2-40B4-BE49-F238E27FC236}">
-                <a16:creationId xmlns:a16="http://schemas.microsoft.com/office/drawing/2014/main" id="{4F0E9950-DDFD-498D-B64F-29F22FFC6EDF}"/>
+                <a16:creationId xmlns:a16="http://schemas.microsoft.com/office/drawing/2014/main" id="{6ACE79EA-35B1-4D54-B1D0-761AFA3569E8}"/>
               </a:ext>
             </a:extLst>
           </p:cNvPr>
@@ -6309,7 +6429,10 @@
           <a:bodyPr/>
           <a:lstStyle/>
           <a:p>
-            <a:endParaRPr lang="en-US" cap="none" dirty="0"/>
+            <a:r>
+              <a:rPr lang="en-US" cap="none" dirty="0"/>
+              <a:t>Design</a:t>
+            </a:r>
           </a:p>
         </p:txBody>
       </p:sp>
@@ -6318,7 +6441,7 @@
           <p:cNvPr id="3" name="Content Placeholder 2">
             <a:extLst>
               <a:ext uri="{FF2B5EF4-FFF2-40B4-BE49-F238E27FC236}">
-                <a16:creationId xmlns:a16="http://schemas.microsoft.com/office/drawing/2014/main" id="{9CCA3830-8BA5-4A9E-9A8F-58D93F9969BC}"/>
+                <a16:creationId xmlns:a16="http://schemas.microsoft.com/office/drawing/2014/main" id="{3C07D08A-9281-44CD-8A5B-84CCEE0BAFD9}"/>
               </a:ext>
             </a:extLst>
           </p:cNvPr>
@@ -6331,17 +6454,122 @@
         </p:nvSpPr>
         <p:spPr/>
         <p:txBody>
-          <a:bodyPr/>
-          <a:lstStyle/>
-          <a:p>
-            <a:endParaRPr lang="en-US" cap="none" dirty="0"/>
-          </a:p>
-        </p:txBody>
-      </p:sp>
+          <a:bodyPr>
+            <a:normAutofit/>
+          </a:bodyPr>
+          <a:lstStyle/>
+          <a:p>
+            <a:r>
+              <a:rPr lang="en-US" cap="none" dirty="0"/>
+              <a:t>Graphical application consisting of multiple windows</a:t>
+            </a:r>
+          </a:p>
+          <a:p>
+            <a:r>
+              <a:rPr lang="en-US" cap="none" dirty="0"/>
+              <a:t>Allows user to input simple information about daily water consumption in order to gauge how much they waste or save on average</a:t>
+            </a:r>
+          </a:p>
+          <a:p>
+            <a:r>
+              <a:rPr lang="en-US" cap="none" dirty="0"/>
+              <a:t>Saves daily water consumption over the period of a month in order to show consumption over a longer duration of time</a:t>
+            </a:r>
+          </a:p>
+        </p:txBody>
+      </p:sp>
+      <p:pic>
+        <p:nvPicPr>
+          <p:cNvPr id="6" name="Content Placeholder 5">
+            <a:extLst>
+              <a:ext uri="{FF2B5EF4-FFF2-40B4-BE49-F238E27FC236}">
+                <a16:creationId xmlns:a16="http://schemas.microsoft.com/office/drawing/2014/main" id="{4B8373A0-B79C-4951-913B-CDF313F83752}"/>
+              </a:ext>
+            </a:extLst>
+          </p:cNvPr>
+          <p:cNvPicPr>
+            <a:picLocks noGrp="1" noChangeAspect="1"/>
+          </p:cNvPicPr>
+          <p:nvPr>
+            <p:ph sz="quarter" idx="14"/>
+          </p:nvPr>
+        </p:nvPicPr>
+        <p:blipFill>
+          <a:blip r:embed="rId2"/>
+          <a:srcRect/>
+          <a:stretch/>
+        </p:blipFill>
+        <p:spPr>
+          <a:xfrm>
+            <a:off x="6019800" y="2213557"/>
+            <a:ext cx="2773364" cy="1865588"/>
+          </a:xfrm>
+        </p:spPr>
+      </p:pic>
+      <p:pic>
+        <p:nvPicPr>
+          <p:cNvPr id="5" name="Picture 4" descr="Graphical user interface, application&#10;&#10;Description automatically generated">
+            <a:extLst>
+              <a:ext uri="{FF2B5EF4-FFF2-40B4-BE49-F238E27FC236}">
+                <a16:creationId xmlns:a16="http://schemas.microsoft.com/office/drawing/2014/main" id="{442F7304-898A-442E-92C5-D8DDF054CEA4}"/>
+              </a:ext>
+            </a:extLst>
+          </p:cNvPr>
+          <p:cNvPicPr>
+            <a:picLocks noChangeAspect="1"/>
+          </p:cNvPicPr>
+          <p:nvPr/>
+        </p:nvPicPr>
+        <p:blipFill>
+          <a:blip r:embed="rId3"/>
+          <a:stretch>
+            <a:fillRect/>
+          </a:stretch>
+        </p:blipFill>
+        <p:spPr>
+          <a:xfrm>
+            <a:off x="6019800" y="4126469"/>
+            <a:ext cx="6096000" cy="1207876"/>
+          </a:xfrm>
+          <a:prstGeom prst="rect">
+            <a:avLst/>
+          </a:prstGeom>
+        </p:spPr>
+      </p:pic>
+      <p:pic>
+        <p:nvPicPr>
+          <p:cNvPr id="8" name="Picture 7" descr="Graphical user interface, text, application&#10;&#10;Description automatically generated">
+            <a:extLst>
+              <a:ext uri="{FF2B5EF4-FFF2-40B4-BE49-F238E27FC236}">
+                <a16:creationId xmlns:a16="http://schemas.microsoft.com/office/drawing/2014/main" id="{294DE0BA-03BD-4809-9E7A-FCD136C16241}"/>
+              </a:ext>
+            </a:extLst>
+          </p:cNvPr>
+          <p:cNvPicPr>
+            <a:picLocks noChangeAspect="1"/>
+          </p:cNvPicPr>
+          <p:nvPr/>
+        </p:nvPicPr>
+        <p:blipFill>
+          <a:blip r:embed="rId4"/>
+          <a:stretch>
+            <a:fillRect/>
+          </a:stretch>
+        </p:blipFill>
+        <p:spPr>
+          <a:xfrm>
+            <a:off x="6019800" y="5381669"/>
+            <a:ext cx="4129664" cy="1047896"/>
+          </a:xfrm>
+          <a:prstGeom prst="rect">
+            <a:avLst/>
+          </a:prstGeom>
+        </p:spPr>
+      </p:pic>
     </p:spTree>
     <p:extLst>
       <p:ext uri="{BB962C8B-B14F-4D97-AF65-F5344CB8AC3E}">
-        <p14:creationId xmlns:p14="http://schemas.microsoft.com/office/powerpoint/2010/main" val="1700516614"/>
+        <p14:creationId xmlns:p14="http://schemas.microsoft.com/office/powerpoint/2010/main" val="2517951660"/>
       </p:ext>
     </p:extLst>
   </p:cSld>
@@ -6352,6 +6580,156 @@
 </file>
 
 <file path=ppt/slides/slide4.xml><?xml version="1.0" encoding="utf-8"?>
+<p:sld xmlns:a="http://schemas.openxmlformats.org/drawingml/2006/main" xmlns:r="http://schemas.openxmlformats.org/officeDocument/2006/relationships" xmlns:p="http://schemas.openxmlformats.org/presentationml/2006/main">
+  <p:cSld>
+    <p:spTree>
+      <p:nvGrpSpPr>
+        <p:cNvPr id="1" name=""/>
+        <p:cNvGrpSpPr/>
+        <p:nvPr/>
+      </p:nvGrpSpPr>
+      <p:grpSpPr>
+        <a:xfrm>
+          <a:off x="0" y="0"/>
+          <a:ext cx="0" cy="0"/>
+          <a:chOff x="0" y="0"/>
+          <a:chExt cx="0" cy="0"/>
+        </a:xfrm>
+      </p:grpSpPr>
+      <p:sp>
+        <p:nvSpPr>
+          <p:cNvPr id="2" name="Title 1">
+            <a:extLst>
+              <a:ext uri="{FF2B5EF4-FFF2-40B4-BE49-F238E27FC236}">
+                <a16:creationId xmlns:a16="http://schemas.microsoft.com/office/drawing/2014/main" id="{6ACE79EA-35B1-4D54-B1D0-761AFA3569E8}"/>
+              </a:ext>
+            </a:extLst>
+          </p:cNvPr>
+          <p:cNvSpPr>
+            <a:spLocks noGrp="1"/>
+          </p:cNvSpPr>
+          <p:nvPr>
+            <p:ph type="title"/>
+          </p:nvPr>
+        </p:nvSpPr>
+        <p:spPr/>
+        <p:txBody>
+          <a:bodyPr/>
+          <a:lstStyle/>
+          <a:p>
+            <a:r>
+              <a:rPr lang="en-US" cap="none" dirty="0"/>
+              <a:t>Implementation</a:t>
+            </a:r>
+          </a:p>
+        </p:txBody>
+      </p:sp>
+      <p:sp>
+        <p:nvSpPr>
+          <p:cNvPr id="3" name="Content Placeholder 2">
+            <a:extLst>
+              <a:ext uri="{FF2B5EF4-FFF2-40B4-BE49-F238E27FC236}">
+                <a16:creationId xmlns:a16="http://schemas.microsoft.com/office/drawing/2014/main" id="{3C07D08A-9281-44CD-8A5B-84CCEE0BAFD9}"/>
+              </a:ext>
+            </a:extLst>
+          </p:cNvPr>
+          <p:cNvSpPr>
+            <a:spLocks noGrp="1"/>
+          </p:cNvSpPr>
+          <p:nvPr>
+            <p:ph sz="quarter" idx="13"/>
+          </p:nvPr>
+        </p:nvSpPr>
+        <p:spPr/>
+        <p:txBody>
+          <a:bodyPr>
+            <a:normAutofit/>
+          </a:bodyPr>
+          <a:lstStyle/>
+          <a:p>
+            <a:r>
+              <a:rPr lang="en-US" cap="none" dirty="0"/>
+              <a:t>Written in Java</a:t>
+            </a:r>
+          </a:p>
+          <a:p>
+            <a:r>
+              <a:rPr lang="en-US" cap="none" dirty="0"/>
+              <a:t>GUI consists of three windows, with only one being displayed at a time</a:t>
+            </a:r>
+          </a:p>
+          <a:p>
+            <a:pPr lvl="1"/>
+            <a:r>
+              <a:rPr lang="en-US" cap="none" dirty="0"/>
+              <a:t>Month view window</a:t>
+            </a:r>
+          </a:p>
+          <a:p>
+            <a:pPr lvl="1"/>
+            <a:r>
+              <a:rPr lang="en-US" cap="none" dirty="0"/>
+              <a:t>Day view window</a:t>
+            </a:r>
+          </a:p>
+          <a:p>
+            <a:pPr lvl="1"/>
+            <a:r>
+              <a:rPr lang="en-US" cap="none" dirty="0"/>
+              <a:t>Input window</a:t>
+            </a:r>
+          </a:p>
+          <a:p>
+            <a:r>
+              <a:rPr lang="en-US" cap="none" dirty="0"/>
+              <a:t>All the windows share a calendar which is used to store the daily consumption values</a:t>
+            </a:r>
+          </a:p>
+        </p:txBody>
+      </p:sp>
+      <p:pic>
+        <p:nvPicPr>
+          <p:cNvPr id="6" name="Content Placeholder 5" descr="Graphical user interface&#10;&#10;Description automatically generated">
+            <a:extLst>
+              <a:ext uri="{FF2B5EF4-FFF2-40B4-BE49-F238E27FC236}">
+                <a16:creationId xmlns:a16="http://schemas.microsoft.com/office/drawing/2014/main" id="{4B8373A0-B79C-4951-913B-CDF313F83752}"/>
+              </a:ext>
+            </a:extLst>
+          </p:cNvPr>
+          <p:cNvPicPr>
+            <a:picLocks noGrp="1" noChangeAspect="1"/>
+          </p:cNvPicPr>
+          <p:nvPr>
+            <p:ph sz="quarter" idx="14"/>
+          </p:nvPr>
+        </p:nvPicPr>
+        <p:blipFill>
+          <a:blip r:embed="rId2"/>
+          <a:stretch>
+            <a:fillRect/>
+          </a:stretch>
+        </p:blipFill>
+        <p:spPr>
+          <a:xfrm>
+            <a:off x="6434137" y="2883694"/>
+            <a:ext cx="4581525" cy="2390775"/>
+          </a:xfrm>
+        </p:spPr>
+      </p:pic>
+    </p:spTree>
+    <p:extLst>
+      <p:ext uri="{BB962C8B-B14F-4D97-AF65-F5344CB8AC3E}">
+        <p14:creationId xmlns:p14="http://schemas.microsoft.com/office/powerpoint/2010/main" val="980565988"/>
+      </p:ext>
+    </p:extLst>
+  </p:cSld>
+  <p:clrMapOvr>
+    <a:masterClrMapping/>
+  </p:clrMapOvr>
+</p:sld>
+</file>
+
+<file path=ppt/slides/slide5.xml><?xml version="1.0" encoding="utf-8"?>
 <p:sld xmlns:a="http://schemas.openxmlformats.org/drawingml/2006/main" xmlns:r="http://schemas.openxmlformats.org/officeDocument/2006/relationships" xmlns:p="http://schemas.openxmlformats.org/presentationml/2006/main">
   <p:cSld>
     <p:spTree>

</xml_diff>

<commit_message>
added motivation slide and some sources
</commit_message>
<xml_diff>
--- a/assets/Climate - Water Consumption Calendar.pptx
+++ b/assets/Climate - Water Consumption Calendar.pptx
@@ -7,9 +7,10 @@
   <p:sldIdLst>
     <p:sldId id="256" r:id="rId2"/>
     <p:sldId id="257" r:id="rId3"/>
-    <p:sldId id="261" r:id="rId4"/>
-    <p:sldId id="260" r:id="rId5"/>
-    <p:sldId id="259" r:id="rId6"/>
+    <p:sldId id="259" r:id="rId4"/>
+    <p:sldId id="261" r:id="rId5"/>
+    <p:sldId id="260" r:id="rId6"/>
+    <p:sldId id="262" r:id="rId7"/>
   </p:sldIdLst>
   <p:sldSz cx="12192000" cy="6858000"/>
   <p:notesSz cx="6858000" cy="9144000"/>
@@ -121,12 +122,177 @@
   <p1510:revLst>
     <p1510:client id="{3E6A00EA-F732-4370-B744-FDEAE37D42D4}" v="7" dt="2021-04-10T19:24:15.745"/>
     <p1510:client id="{73497908-12DC-4099-8029-8185DDE862F4}" v="2" dt="2021-04-10T19:10:59.015"/>
+    <p1510:client id="{ED459443-4836-477A-897E-34A3596326FB}" v="27" dt="2021-04-10T19:45:43.143"/>
   </p1510:revLst>
 </p1510:revInfo>
 </file>
 
 <file path=ppt/changesInfos/changesInfo1.xml><?xml version="1.0" encoding="utf-8"?>
 <pc:chgInfo xmlns:a="http://schemas.openxmlformats.org/drawingml/2006/main" xmlns:r="http://schemas.openxmlformats.org/officeDocument/2006/relationships" xmlns:ac="http://schemas.microsoft.com/office/drawing/2013/main/command" xmlns:pc="http://schemas.microsoft.com/office/powerpoint/2013/main/command">
+  <pc:docChgLst>
+    <pc:chgData name="Meepix Gaming" userId="9f756df3fd3b21f0" providerId="LiveId" clId="{ED459443-4836-477A-897E-34A3596326FB}"/>
+    <pc:docChg chg="custSel addSld delSld modSld sldOrd">
+      <pc:chgData name="Meepix Gaming" userId="9f756df3fd3b21f0" providerId="LiveId" clId="{ED459443-4836-477A-897E-34A3596326FB}" dt="2021-04-10T19:45:43.138" v="673" actId="20577"/>
+      <pc:docMkLst>
+        <pc:docMk/>
+      </pc:docMkLst>
+      <pc:sldChg chg="addSp modSp mod ord">
+        <pc:chgData name="Meepix Gaming" userId="9f756df3fd3b21f0" providerId="LiveId" clId="{ED459443-4836-477A-897E-34A3596326FB}" dt="2021-04-10T19:40:01.481" v="634" actId="1076"/>
+        <pc:sldMkLst>
+          <pc:docMk/>
+          <pc:sldMk cId="847145450" sldId="257"/>
+        </pc:sldMkLst>
+        <pc:spChg chg="mod">
+          <ac:chgData name="Meepix Gaming" userId="9f756df3fd3b21f0" providerId="LiveId" clId="{ED459443-4836-477A-897E-34A3596326FB}" dt="2021-04-10T19:34:06.707" v="168" actId="20577"/>
+          <ac:spMkLst>
+            <pc:docMk/>
+            <pc:sldMk cId="847145450" sldId="257"/>
+            <ac:spMk id="3" creationId="{9CCA3830-8BA5-4A9E-9A8F-58D93F9969BC}"/>
+          </ac:spMkLst>
+        </pc:spChg>
+        <pc:picChg chg="add mod">
+          <ac:chgData name="Meepix Gaming" userId="9f756df3fd3b21f0" providerId="LiveId" clId="{ED459443-4836-477A-897E-34A3596326FB}" dt="2021-04-10T19:40:01.481" v="634" actId="1076"/>
+          <ac:picMkLst>
+            <pc:docMk/>
+            <pc:sldMk cId="847145450" sldId="257"/>
+            <ac:picMk id="2050" creationId="{75D00BE1-EE15-4EFD-8620-2C0749A22F6E}"/>
+          </ac:picMkLst>
+        </pc:picChg>
+      </pc:sldChg>
+      <pc:sldChg chg="addSp delSp modSp mod ord setBg">
+        <pc:chgData name="Meepix Gaming" userId="9f756df3fd3b21f0" providerId="LiveId" clId="{ED459443-4836-477A-897E-34A3596326FB}" dt="2021-04-10T19:43:39.138" v="662" actId="339"/>
+        <pc:sldMkLst>
+          <pc:docMk/>
+          <pc:sldMk cId="2185485672" sldId="259"/>
+        </pc:sldMkLst>
+        <pc:spChg chg="mod">
+          <ac:chgData name="Meepix Gaming" userId="9f756df3fd3b21f0" providerId="LiveId" clId="{ED459443-4836-477A-897E-34A3596326FB}" dt="2021-04-10T19:42:26.582" v="659" actId="26606"/>
+          <ac:spMkLst>
+            <pc:docMk/>
+            <pc:sldMk cId="2185485672" sldId="259"/>
+            <ac:spMk id="2" creationId="{4F0E9950-DDFD-498D-B64F-29F22FFC6EDF}"/>
+          </ac:spMkLst>
+        </pc:spChg>
+        <pc:spChg chg="mod">
+          <ac:chgData name="Meepix Gaming" userId="9f756df3fd3b21f0" providerId="LiveId" clId="{ED459443-4836-477A-897E-34A3596326FB}" dt="2021-04-10T19:42:26.582" v="659" actId="26606"/>
+          <ac:spMkLst>
+            <pc:docMk/>
+            <pc:sldMk cId="2185485672" sldId="259"/>
+            <ac:spMk id="3" creationId="{9CCA3830-8BA5-4A9E-9A8F-58D93F9969BC}"/>
+          </ac:spMkLst>
+        </pc:spChg>
+        <pc:spChg chg="add">
+          <ac:chgData name="Meepix Gaming" userId="9f756df3fd3b21f0" providerId="LiveId" clId="{ED459443-4836-477A-897E-34A3596326FB}" dt="2021-04-10T19:42:26.582" v="659" actId="26606"/>
+          <ac:spMkLst>
+            <pc:docMk/>
+            <pc:sldMk cId="2185485672" sldId="259"/>
+            <ac:spMk id="77" creationId="{6E3254AE-C4CD-426D-A6E8-7FA13B0F889C}"/>
+          </ac:spMkLst>
+        </pc:spChg>
+        <pc:picChg chg="add">
+          <ac:chgData name="Meepix Gaming" userId="9f756df3fd3b21f0" providerId="LiveId" clId="{ED459443-4836-477A-897E-34A3596326FB}" dt="2021-04-10T19:42:26.582" v="659" actId="26606"/>
+          <ac:picMkLst>
+            <pc:docMk/>
+            <pc:sldMk cId="2185485672" sldId="259"/>
+            <ac:picMk id="79" creationId="{F5C53434-A0C7-4A81-8EB0-D460DAD9BB65}"/>
+          </ac:picMkLst>
+        </pc:picChg>
+        <pc:picChg chg="add del mod">
+          <ac:chgData name="Meepix Gaming" userId="9f756df3fd3b21f0" providerId="LiveId" clId="{ED459443-4836-477A-897E-34A3596326FB}" dt="2021-04-10T19:39:52.725" v="632" actId="478"/>
+          <ac:picMkLst>
+            <pc:docMk/>
+            <pc:sldMk cId="2185485672" sldId="259"/>
+            <ac:picMk id="1026" creationId="{1C661D1C-AF37-492E-9E3E-8D9B056590FD}"/>
+          </ac:picMkLst>
+        </pc:picChg>
+        <pc:picChg chg="add del mod">
+          <ac:chgData name="Meepix Gaming" userId="9f756df3fd3b21f0" providerId="LiveId" clId="{ED459443-4836-477A-897E-34A3596326FB}" dt="2021-04-10T19:42:19.465" v="657" actId="478"/>
+          <ac:picMkLst>
+            <pc:docMk/>
+            <pc:sldMk cId="2185485672" sldId="259"/>
+            <ac:picMk id="1028" creationId="{DE61E03F-8CD7-4273-95D6-E8B3D0DAB4C2}"/>
+          </ac:picMkLst>
+        </pc:picChg>
+        <pc:picChg chg="add del">
+          <ac:chgData name="Meepix Gaming" userId="9f756df3fd3b21f0" providerId="LiveId" clId="{ED459443-4836-477A-897E-34A3596326FB}" dt="2021-04-10T19:42:19.465" v="657" actId="478"/>
+          <ac:picMkLst>
+            <pc:docMk/>
+            <pc:sldMk cId="2185485672" sldId="259"/>
+            <ac:picMk id="1030" creationId="{D8595A5C-2B2C-4939-9E7C-C2EF8DBBF4B1}"/>
+          </ac:picMkLst>
+        </pc:picChg>
+        <pc:picChg chg="add mod ord">
+          <ac:chgData name="Meepix Gaming" userId="9f756df3fd3b21f0" providerId="LiveId" clId="{ED459443-4836-477A-897E-34A3596326FB}" dt="2021-04-10T19:43:39.138" v="662" actId="339"/>
+          <ac:picMkLst>
+            <pc:docMk/>
+            <pc:sldMk cId="2185485672" sldId="259"/>
+            <ac:picMk id="1032" creationId="{4F2756D3-440C-4AFD-8FFC-C63CBFC312C7}"/>
+          </ac:picMkLst>
+        </pc:picChg>
+      </pc:sldChg>
+      <pc:sldChg chg="modSp mod">
+        <pc:chgData name="Meepix Gaming" userId="9f756df3fd3b21f0" providerId="LiveId" clId="{ED459443-4836-477A-897E-34A3596326FB}" dt="2021-04-10T19:44:43.110" v="665" actId="1076"/>
+        <pc:sldMkLst>
+          <pc:docMk/>
+          <pc:sldMk cId="2517951660" sldId="261"/>
+        </pc:sldMkLst>
+        <pc:picChg chg="mod">
+          <ac:chgData name="Meepix Gaming" userId="9f756df3fd3b21f0" providerId="LiveId" clId="{ED459443-4836-477A-897E-34A3596326FB}" dt="2021-04-10T19:44:43.110" v="665" actId="1076"/>
+          <ac:picMkLst>
+            <pc:docMk/>
+            <pc:sldMk cId="2517951660" sldId="261"/>
+            <ac:picMk id="5" creationId="{442F7304-898A-442E-92C5-D8DDF054CEA4}"/>
+          </ac:picMkLst>
+        </pc:picChg>
+        <pc:picChg chg="mod">
+          <ac:chgData name="Meepix Gaming" userId="9f756df3fd3b21f0" providerId="LiveId" clId="{ED459443-4836-477A-897E-34A3596326FB}" dt="2021-04-10T19:44:43.110" v="665" actId="1076"/>
+          <ac:picMkLst>
+            <pc:docMk/>
+            <pc:sldMk cId="2517951660" sldId="261"/>
+            <ac:picMk id="6" creationId="{4B8373A0-B79C-4951-913B-CDF313F83752}"/>
+          </ac:picMkLst>
+        </pc:picChg>
+        <pc:picChg chg="mod">
+          <ac:chgData name="Meepix Gaming" userId="9f756df3fd3b21f0" providerId="LiveId" clId="{ED459443-4836-477A-897E-34A3596326FB}" dt="2021-04-10T19:44:43.110" v="665" actId="1076"/>
+          <ac:picMkLst>
+            <pc:docMk/>
+            <pc:sldMk cId="2517951660" sldId="261"/>
+            <ac:picMk id="8" creationId="{294DE0BA-03BD-4809-9E7A-FCD136C16241}"/>
+          </ac:picMkLst>
+        </pc:picChg>
+      </pc:sldChg>
+      <pc:sldChg chg="new del">
+        <pc:chgData name="Meepix Gaming" userId="9f756df3fd3b21f0" providerId="LiveId" clId="{ED459443-4836-477A-897E-34A3596326FB}" dt="2021-04-10T19:40:44.206" v="636" actId="2696"/>
+        <pc:sldMkLst>
+          <pc:docMk/>
+          <pc:sldMk cId="920591597" sldId="262"/>
+        </pc:sldMkLst>
+      </pc:sldChg>
+      <pc:sldChg chg="modSp mod">
+        <pc:chgData name="Meepix Gaming" userId="9f756df3fd3b21f0" providerId="LiveId" clId="{ED459443-4836-477A-897E-34A3596326FB}" dt="2021-04-10T19:45:43.138" v="673" actId="20577"/>
+        <pc:sldMkLst>
+          <pc:docMk/>
+          <pc:sldMk cId="2367260284" sldId="262"/>
+        </pc:sldMkLst>
+        <pc:spChg chg="mod">
+          <ac:chgData name="Meepix Gaming" userId="9f756df3fd3b21f0" providerId="LiveId" clId="{ED459443-4836-477A-897E-34A3596326FB}" dt="2021-04-10T19:40:57.034" v="644" actId="20577"/>
+          <ac:spMkLst>
+            <pc:docMk/>
+            <pc:sldMk cId="2367260284" sldId="262"/>
+            <ac:spMk id="2" creationId="{4F0E9950-DDFD-498D-B64F-29F22FFC6EDF}"/>
+          </ac:spMkLst>
+        </pc:spChg>
+        <pc:spChg chg="mod">
+          <ac:chgData name="Meepix Gaming" userId="9f756df3fd3b21f0" providerId="LiveId" clId="{ED459443-4836-477A-897E-34A3596326FB}" dt="2021-04-10T19:45:43.138" v="673" actId="20577"/>
+          <ac:spMkLst>
+            <pc:docMk/>
+            <pc:sldMk cId="2367260284" sldId="262"/>
+            <ac:spMk id="3" creationId="{9CCA3830-8BA5-4A9E-9A8F-58D93F9969BC}"/>
+          </ac:spMkLst>
+        </pc:spChg>
+      </pc:sldChg>
+    </pc:docChg>
+  </pc:docChgLst>
   <pc:docChgLst>
     <pc:chgData name="Meepix Gaming" userId="9f756df3fd3b21f0" providerId="LiveId" clId="{73497908-12DC-4099-8029-8185DDE862F4}"/>
     <pc:docChg chg="modSld">
@@ -6373,11 +6539,58 @@
             <a:pPr lvl="1"/>
             <a:r>
               <a:rPr lang="en-US" cap="none" dirty="0"/>
-              <a:t>We need to gradually decrease the amount we need to adapt to climate change</a:t>
-            </a:r>
-          </a:p>
-        </p:txBody>
-      </p:sp>
+              <a:t>We need to gradually decrease the amount we require to adapt ourselves to climate change</a:t>
+            </a:r>
+          </a:p>
+        </p:txBody>
+      </p:sp>
+      <p:pic>
+        <p:nvPicPr>
+          <p:cNvPr id="2050" name="Picture 2" descr="map of future water withdrawals in the us">
+            <a:extLst>
+              <a:ext uri="{FF2B5EF4-FFF2-40B4-BE49-F238E27FC236}">
+                <a16:creationId xmlns:a16="http://schemas.microsoft.com/office/drawing/2014/main" id="{75D00BE1-EE15-4EFD-8620-2C0749A22F6E}"/>
+              </a:ext>
+            </a:extLst>
+          </p:cNvPr>
+          <p:cNvPicPr>
+            <a:picLocks noChangeAspect="1" noChangeArrowheads="1"/>
+          </p:cNvPicPr>
+          <p:nvPr/>
+        </p:nvPicPr>
+        <p:blipFill>
+          <a:blip r:embed="rId2">
+            <a:extLst>
+              <a:ext uri="{28A0092B-C50C-407E-A947-70E740481C1C}">
+                <a14:useLocalDpi xmlns:a14="http://schemas.microsoft.com/office/drawing/2010/main" val="0"/>
+              </a:ext>
+            </a:extLst>
+          </a:blip>
+          <a:srcRect/>
+          <a:stretch>
+            <a:fillRect/>
+          </a:stretch>
+        </p:blipFill>
+        <p:spPr bwMode="auto">
+          <a:xfrm>
+            <a:off x="3061974" y="4079145"/>
+            <a:ext cx="6067425" cy="2505075"/>
+          </a:xfrm>
+          <a:prstGeom prst="rect">
+            <a:avLst/>
+          </a:prstGeom>
+          <a:noFill/>
+          <a:extLst>
+            <a:ext uri="{909E8E84-426E-40DD-AFC4-6F175D3DCCD1}">
+              <a14:hiddenFill xmlns:a14="http://schemas.microsoft.com/office/drawing/2010/main">
+                <a:solidFill>
+                  <a:srgbClr val="FFFFFF"/>
+                </a:solidFill>
+              </a14:hiddenFill>
+            </a:ext>
+          </a:extLst>
+        </p:spPr>
+      </p:pic>
     </p:spTree>
     <p:extLst>
       <p:ext uri="{BB962C8B-B14F-4D97-AF65-F5344CB8AC3E}">
@@ -6394,6 +6607,28 @@
 <file path=ppt/slides/slide3.xml><?xml version="1.0" encoding="utf-8"?>
 <p:sld xmlns:a="http://schemas.openxmlformats.org/drawingml/2006/main" xmlns:r="http://schemas.openxmlformats.org/officeDocument/2006/relationships" xmlns:p="http://schemas.openxmlformats.org/presentationml/2006/main">
   <p:cSld>
+    <p:bg>
+      <p:bgPr>
+        <a:gradFill rotWithShape="1">
+          <a:gsLst>
+            <a:gs pos="0">
+              <a:schemeClr val="bg1">
+                <a:tint val="90000"/>
+                <a:lumMod val="110000"/>
+              </a:schemeClr>
+            </a:gs>
+            <a:gs pos="100000">
+              <a:schemeClr val="bg1">
+                <a:shade val="64000"/>
+                <a:lumMod val="88000"/>
+              </a:schemeClr>
+            </a:gs>
+          </a:gsLst>
+          <a:lin ang="5400000" scaled="0"/>
+        </a:gradFill>
+        <a:effectLst/>
+      </p:bgPr>
+    </p:bg>
     <p:spTree>
       <p:nvGrpSpPr>
         <p:cNvPr id="1" name=""/>
@@ -6408,168 +6643,263 @@
           <a:chExt cx="0" cy="0"/>
         </a:xfrm>
       </p:grpSpPr>
-      <p:sp>
-        <p:nvSpPr>
-          <p:cNvPr id="2" name="Title 1">
+      <p:sp useBgFill="1">
+        <p:nvSpPr>
+          <p:cNvPr id="77" name="Rectangle 76">
             <a:extLst>
               <a:ext uri="{FF2B5EF4-FFF2-40B4-BE49-F238E27FC236}">
-                <a16:creationId xmlns:a16="http://schemas.microsoft.com/office/drawing/2014/main" id="{6ACE79EA-35B1-4D54-B1D0-761AFA3569E8}"/>
+                <a16:creationId xmlns:a16="http://schemas.microsoft.com/office/drawing/2014/main" id="{6E3254AE-C4CD-426D-A6E8-7FA13B0F889C}"/>
+              </a:ext>
+              <a:ext uri="{C183D7F6-B498-43B3-948B-1728B52AA6E4}">
+                <adec:decorative xmlns:adec="http://schemas.microsoft.com/office/drawing/2017/decorative" val="1"/>
               </a:ext>
             </a:extLst>
           </p:cNvPr>
           <p:cNvSpPr>
-            <a:spLocks noGrp="1"/>
-          </p:cNvSpPr>
-          <p:nvPr>
-            <p:ph type="title"/>
-          </p:nvPr>
-        </p:nvSpPr>
-        <p:spPr/>
-        <p:txBody>
-          <a:bodyPr/>
-          <a:lstStyle/>
-          <a:p>
-            <a:r>
-              <a:rPr lang="en-US" cap="none" dirty="0"/>
-              <a:t>Design</a:t>
-            </a:r>
-          </a:p>
-        </p:txBody>
-      </p:sp>
-      <p:sp>
-        <p:nvSpPr>
-          <p:cNvPr id="3" name="Content Placeholder 2">
+            <a:spLocks noGrp="1" noRot="1" noChangeAspect="1" noMove="1" noResize="1" noEditPoints="1" noAdjustHandles="1" noChangeArrowheads="1" noChangeShapeType="1" noTextEdit="1"/>
+          </p:cNvSpPr>
+          <p:nvPr>
+            <p:extLst>
+              <p:ext uri="{386F3935-93C4-4BCD-93E2-E3B085C9AB24}">
+                <p16:designElem xmlns:p16="http://schemas.microsoft.com/office/powerpoint/2015/main" val="1"/>
+              </p:ext>
+            </p:extLst>
+          </p:nvPr>
+        </p:nvSpPr>
+        <p:spPr>
+          <a:xfrm>
+            <a:off x="0" y="0"/>
+            <a:ext cx="12192000" cy="6858000"/>
+          </a:xfrm>
+          <a:prstGeom prst="rect">
+            <a:avLst/>
+          </a:prstGeom>
+          <a:ln>
+            <a:noFill/>
+          </a:ln>
+        </p:spPr>
+        <p:style>
+          <a:lnRef idx="2">
+            <a:schemeClr val="accent1">
+              <a:shade val="50000"/>
+            </a:schemeClr>
+          </a:lnRef>
+          <a:fillRef idx="1">
+            <a:schemeClr val="accent1"/>
+          </a:fillRef>
+          <a:effectRef idx="0">
+            <a:schemeClr val="accent1"/>
+          </a:effectRef>
+          <a:fontRef idx="minor">
+            <a:schemeClr val="lt1"/>
+          </a:fontRef>
+        </p:style>
+        <p:txBody>
+          <a:bodyPr rtlCol="0" anchor="ctr"/>
+          <a:lstStyle/>
+          <a:p>
+            <a:pPr algn="ctr"/>
+            <a:endParaRPr lang="en-US"/>
+          </a:p>
+        </p:txBody>
+      </p:sp>
+      <p:pic>
+        <p:nvPicPr>
+          <p:cNvPr id="1032" name="Picture 8" descr="Image source: Residential End Uses of Water Version 2, 2016">
             <a:extLst>
               <a:ext uri="{FF2B5EF4-FFF2-40B4-BE49-F238E27FC236}">
-                <a16:creationId xmlns:a16="http://schemas.microsoft.com/office/drawing/2014/main" id="{3C07D08A-9281-44CD-8A5B-84CCEE0BAFD9}"/>
-              </a:ext>
-            </a:extLst>
-          </p:cNvPr>
-          <p:cNvSpPr>
-            <a:spLocks noGrp="1"/>
-          </p:cNvSpPr>
-          <p:nvPr>
-            <p:ph sz="quarter" idx="13"/>
-          </p:nvPr>
-        </p:nvSpPr>
-        <p:spPr/>
-        <p:txBody>
-          <a:bodyPr>
-            <a:normAutofit/>
-          </a:bodyPr>
-          <a:lstStyle/>
-          <a:p>
-            <a:r>
-              <a:rPr lang="en-US" cap="none" dirty="0"/>
-              <a:t>Graphical application consisting of multiple windows</a:t>
-            </a:r>
-          </a:p>
-          <a:p>
-            <a:r>
-              <a:rPr lang="en-US" cap="none" dirty="0"/>
-              <a:t>Allows user to input simple information about daily water consumption in order to gauge how much they waste or save on average</a:t>
-            </a:r>
-          </a:p>
-          <a:p>
-            <a:r>
-              <a:rPr lang="en-US" cap="none" dirty="0"/>
-              <a:t>Saves daily water consumption over the period of a month in order to show consumption over a longer duration of time</a:t>
-            </a:r>
-          </a:p>
-        </p:txBody>
-      </p:sp>
-      <p:pic>
-        <p:nvPicPr>
-          <p:cNvPr id="6" name="Content Placeholder 5">
-            <a:extLst>
-              <a:ext uri="{FF2B5EF4-FFF2-40B4-BE49-F238E27FC236}">
-                <a16:creationId xmlns:a16="http://schemas.microsoft.com/office/drawing/2014/main" id="{4B8373A0-B79C-4951-913B-CDF313F83752}"/>
+                <a16:creationId xmlns:a16="http://schemas.microsoft.com/office/drawing/2014/main" id="{4F2756D3-440C-4AFD-8FFC-C63CBFC312C7}"/>
               </a:ext>
             </a:extLst>
           </p:cNvPr>
           <p:cNvPicPr>
-            <a:picLocks noGrp="1" noChangeAspect="1"/>
+            <a:picLocks noChangeAspect="1" noChangeArrowheads="1"/>
           </p:cNvPicPr>
-          <p:nvPr>
-            <p:ph sz="quarter" idx="14"/>
-          </p:nvPr>
+          <p:nvPr/>
         </p:nvPicPr>
         <p:blipFill>
-          <a:blip r:embed="rId2"/>
-          <a:srcRect/>
-          <a:stretch/>
+          <a:blip r:embed="rId2">
+            <a:extLst>
+              <a:ext uri="{28A0092B-C50C-407E-A947-70E740481C1C}">
+                <a14:useLocalDpi xmlns:a14="http://schemas.microsoft.com/office/drawing/2010/main" val="0"/>
+              </a:ext>
+            </a:extLst>
+          </a:blip>
+          <a:stretch>
+            <a:fillRect/>
+          </a:stretch>
         </p:blipFill>
-        <p:spPr>
-          <a:xfrm>
-            <a:off x="6019800" y="2213557"/>
-            <a:ext cx="2773364" cy="1865588"/>
-          </a:xfrm>
+        <p:spPr bwMode="auto">
+          <a:xfrm>
+            <a:off x="6621884" y="2367091"/>
+            <a:ext cx="4361919" cy="3424107"/>
+          </a:xfrm>
+          <a:prstGeom prst="rect">
+            <a:avLst/>
+          </a:prstGeom>
+          <a:solidFill>
+            <a:srgbClr val="FFFFFF">
+              <a:shade val="85000"/>
+            </a:srgbClr>
+          </a:solidFill>
+          <a:ln w="88900" cap="sq">
+            <a:solidFill>
+              <a:srgbClr val="FFFFFF"/>
+            </a:solidFill>
+            <a:miter lim="800000"/>
+          </a:ln>
+          <a:effectLst/>
+          <a:scene3d>
+            <a:camera prst="orthographicFront"/>
+            <a:lightRig rig="twoPt" dir="t">
+              <a:rot lat="0" lon="0" rev="7200000"/>
+            </a:lightRig>
+          </a:scene3d>
+          <a:sp3d>
+            <a:bevelT w="25400" h="19050"/>
+            <a:contourClr>
+              <a:srgbClr val="FFFFFF"/>
+            </a:contourClr>
+          </a:sp3d>
+          <a:extLst>
+            <a:ext uri="{909E8E84-426E-40DD-AFC4-6F175D3DCCD1}">
+              <a14:hiddenFill xmlns:a14="http://schemas.microsoft.com/office/drawing/2010/main">
+                <a:solidFill>
+                  <a:srgbClr val="FFFFFF"/>
+                </a:solidFill>
+              </a14:hiddenFill>
+            </a:ext>
+          </a:extLst>
         </p:spPr>
       </p:pic>
       <p:pic>
         <p:nvPicPr>
-          <p:cNvPr id="5" name="Picture 4" descr="Graphical user interface, application&#10;&#10;Description automatically generated">
+          <p:cNvPr id="79" name="Picture 78">
             <a:extLst>
               <a:ext uri="{FF2B5EF4-FFF2-40B4-BE49-F238E27FC236}">
-                <a16:creationId xmlns:a16="http://schemas.microsoft.com/office/drawing/2014/main" id="{442F7304-898A-442E-92C5-D8DDF054CEA4}"/>
+                <a16:creationId xmlns:a16="http://schemas.microsoft.com/office/drawing/2014/main" id="{F5C53434-A0C7-4A81-8EB0-D460DAD9BB65}"/>
+              </a:ext>
+              <a:ext uri="{C183D7F6-B498-43B3-948B-1728B52AA6E4}">
+                <adec:decorative xmlns:adec="http://schemas.microsoft.com/office/drawing/2017/decorative" val="1"/>
               </a:ext>
             </a:extLst>
           </p:cNvPr>
           <p:cNvPicPr>
-            <a:picLocks noChangeAspect="1"/>
+            <a:picLocks noGrp="1" noRot="1" noChangeAspect="1" noMove="1" noResize="1" noEditPoints="1" noAdjustHandles="1" noChangeArrowheads="1" noChangeShapeType="1" noCrop="1"/>
           </p:cNvPicPr>
-          <p:nvPr/>
+          <p:nvPr>
+            <p:extLst>
+              <p:ext uri="{386F3935-93C4-4BCD-93E2-E3B085C9AB24}">
+                <p16:designElem xmlns:p16="http://schemas.microsoft.com/office/powerpoint/2015/main" val="1"/>
+              </p:ext>
+            </p:extLst>
+          </p:nvPr>
         </p:nvPicPr>
         <p:blipFill>
-          <a:blip r:embed="rId3"/>
+          <a:blip r:embed="rId3">
+            <a:extLst>
+              <a:ext uri="{28A0092B-C50C-407E-A947-70E740481C1C}">
+                <a14:useLocalDpi xmlns:a14="http://schemas.microsoft.com/office/drawing/2010/main" val="0"/>
+              </a:ext>
+            </a:extLst>
+          </a:blip>
           <a:stretch>
             <a:fillRect/>
           </a:stretch>
         </p:blipFill>
         <p:spPr>
           <a:xfrm>
-            <a:off x="6019800" y="4126469"/>
-            <a:ext cx="6096000" cy="1207876"/>
+            <a:off x="0" y="0"/>
+            <a:ext cx="12192000" cy="6858000"/>
           </a:xfrm>
           <a:prstGeom prst="rect">
             <a:avLst/>
           </a:prstGeom>
         </p:spPr>
       </p:pic>
-      <p:pic>
-        <p:nvPicPr>
-          <p:cNvPr id="8" name="Picture 7" descr="Graphical user interface, text, application&#10;&#10;Description automatically generated">
+      <p:sp>
+        <p:nvSpPr>
+          <p:cNvPr id="2" name="Title 1">
             <a:extLst>
               <a:ext uri="{FF2B5EF4-FFF2-40B4-BE49-F238E27FC236}">
-                <a16:creationId xmlns:a16="http://schemas.microsoft.com/office/drawing/2014/main" id="{294DE0BA-03BD-4809-9E7A-FCD136C16241}"/>
+                <a16:creationId xmlns:a16="http://schemas.microsoft.com/office/drawing/2014/main" id="{4F0E9950-DDFD-498D-B64F-29F22FFC6EDF}"/>
               </a:ext>
             </a:extLst>
           </p:cNvPr>
-          <p:cNvPicPr>
-            <a:picLocks noChangeAspect="1"/>
-          </p:cNvPicPr>
-          <p:nvPr/>
-        </p:nvPicPr>
-        <p:blipFill>
-          <a:blip r:embed="rId4"/>
-          <a:stretch>
-            <a:fillRect/>
-          </a:stretch>
-        </p:blipFill>
-        <p:spPr>
-          <a:xfrm>
-            <a:off x="6019800" y="5381669"/>
-            <a:ext cx="4129664" cy="1047896"/>
-          </a:xfrm>
-          <a:prstGeom prst="rect">
-            <a:avLst/>
-          </a:prstGeom>
-        </p:spPr>
-      </p:pic>
+          <p:cNvSpPr>
+            <a:spLocks noGrp="1"/>
+          </p:cNvSpPr>
+          <p:nvPr>
+            <p:ph type="title"/>
+          </p:nvPr>
+        </p:nvSpPr>
+        <p:spPr>
+          <a:xfrm>
+            <a:off x="913775" y="618517"/>
+            <a:ext cx="10364451" cy="1596177"/>
+          </a:xfrm>
+        </p:spPr>
+        <p:txBody>
+          <a:bodyPr>
+            <a:normAutofit/>
+          </a:bodyPr>
+          <a:lstStyle/>
+          <a:p>
+            <a:r>
+              <a:rPr lang="en-US" cap="none" dirty="0"/>
+              <a:t>Motivation and Ideas for the Calendar</a:t>
+            </a:r>
+          </a:p>
+        </p:txBody>
+      </p:sp>
+      <p:sp>
+        <p:nvSpPr>
+          <p:cNvPr id="3" name="Content Placeholder 2">
+            <a:extLst>
+              <a:ext uri="{FF2B5EF4-FFF2-40B4-BE49-F238E27FC236}">
+                <a16:creationId xmlns:a16="http://schemas.microsoft.com/office/drawing/2014/main" id="{9CCA3830-8BA5-4A9E-9A8F-58D93F9969BC}"/>
+              </a:ext>
+            </a:extLst>
+          </p:cNvPr>
+          <p:cNvSpPr>
+            <a:spLocks noGrp="1"/>
+          </p:cNvSpPr>
+          <p:nvPr>
+            <p:ph sz="quarter" idx="13"/>
+          </p:nvPr>
+        </p:nvSpPr>
+        <p:spPr>
+          <a:xfrm>
+            <a:off x="913774" y="2367092"/>
+            <a:ext cx="4860493" cy="3424107"/>
+          </a:xfrm>
+        </p:spPr>
+        <p:txBody>
+          <a:bodyPr>
+            <a:normAutofit/>
+          </a:bodyPr>
+          <a:lstStyle/>
+          <a:p>
+            <a:r>
+              <a:rPr lang="en-US" cap="none" dirty="0"/>
+              <a:t>We wanted to make a daily calendar so the user can keep track of consumption and focus on improvement over time</a:t>
+            </a:r>
+          </a:p>
+          <a:p>
+            <a:r>
+              <a:rPr lang="en-US" cap="none" dirty="0"/>
+              <a:t>The averages and comparisons to the average American allow the user to know how they are doing compared to their peers</a:t>
+            </a:r>
+          </a:p>
+          <a:p>
+            <a:endParaRPr lang="en-US" cap="none" dirty="0"/>
+          </a:p>
+        </p:txBody>
+      </p:sp>
     </p:spTree>
     <p:extLst>
       <p:ext uri="{BB962C8B-B14F-4D97-AF65-F5344CB8AC3E}">
-        <p14:creationId xmlns:p14="http://schemas.microsoft.com/office/powerpoint/2010/main" val="2517951660"/>
+        <p14:creationId xmlns:p14="http://schemas.microsoft.com/office/powerpoint/2010/main" val="2185485672"/>
       </p:ext>
     </p:extLst>
   </p:cSld>
@@ -6619,7 +6949,7 @@
           <a:p>
             <a:r>
               <a:rPr lang="en-US" cap="none" dirty="0"/>
-              <a:t>Implementation</a:t>
+              <a:t>Design</a:t>
             </a:r>
           </a:p>
         </p:txBody>
@@ -6649,47 +6979,26 @@
           <a:p>
             <a:r>
               <a:rPr lang="en-US" cap="none" dirty="0"/>
-              <a:t>Written in Java</a:t>
+              <a:t>Graphical application consisting of multiple windows</a:t>
             </a:r>
           </a:p>
           <a:p>
             <a:r>
               <a:rPr lang="en-US" cap="none" dirty="0"/>
-              <a:t>GUI consists of three windows, with only one being displayed at a time</a:t>
-            </a:r>
-          </a:p>
-          <a:p>
-            <a:pPr lvl="1"/>
+              <a:t>Allows user to input simple information about daily water consumption in order to gauge how much they waste or save on average</a:t>
+            </a:r>
+          </a:p>
+          <a:p>
             <a:r>
               <a:rPr lang="en-US" cap="none" dirty="0"/>
-              <a:t>Month view window</a:t>
-            </a:r>
-          </a:p>
-          <a:p>
-            <a:pPr lvl="1"/>
-            <a:r>
-              <a:rPr lang="en-US" cap="none" dirty="0"/>
-              <a:t>Day view window</a:t>
-            </a:r>
-          </a:p>
-          <a:p>
-            <a:pPr lvl="1"/>
-            <a:r>
-              <a:rPr lang="en-US" cap="none" dirty="0"/>
-              <a:t>Input window</a:t>
-            </a:r>
-          </a:p>
-          <a:p>
-            <a:r>
-              <a:rPr lang="en-US" cap="none" dirty="0"/>
-              <a:t>All the windows share a calendar which is used to store the daily consumption values</a:t>
+              <a:t>Saves daily water consumption over the period of a month in order to show consumption over a longer duration of time</a:t>
             </a:r>
           </a:p>
         </p:txBody>
       </p:sp>
       <p:pic>
         <p:nvPicPr>
-          <p:cNvPr id="6" name="Content Placeholder 5" descr="Graphical user interface&#10;&#10;Description automatically generated">
+          <p:cNvPr id="6" name="Content Placeholder 5">
             <a:extLst>
               <a:ext uri="{FF2B5EF4-FFF2-40B4-BE49-F238E27FC236}">
                 <a16:creationId xmlns:a16="http://schemas.microsoft.com/office/drawing/2014/main" id="{4B8373A0-B79C-4951-913B-CDF313F83752}"/>
@@ -6705,21 +7014,80 @@
         </p:nvPicPr>
         <p:blipFill>
           <a:blip r:embed="rId2"/>
+          <a:srcRect/>
+          <a:stretch/>
+        </p:blipFill>
+        <p:spPr>
+          <a:xfrm>
+            <a:off x="7615804" y="1653721"/>
+            <a:ext cx="2773364" cy="1865588"/>
+          </a:xfrm>
+        </p:spPr>
+      </p:pic>
+      <p:pic>
+        <p:nvPicPr>
+          <p:cNvPr id="5" name="Picture 4" descr="Graphical user interface, application&#10;&#10;Description automatically generated">
+            <a:extLst>
+              <a:ext uri="{FF2B5EF4-FFF2-40B4-BE49-F238E27FC236}">
+                <a16:creationId xmlns:a16="http://schemas.microsoft.com/office/drawing/2014/main" id="{442F7304-898A-442E-92C5-D8DDF054CEA4}"/>
+              </a:ext>
+            </a:extLst>
+          </p:cNvPr>
+          <p:cNvPicPr>
+            <a:picLocks noChangeAspect="1"/>
+          </p:cNvPicPr>
+          <p:nvPr/>
+        </p:nvPicPr>
+        <p:blipFill>
+          <a:blip r:embed="rId3"/>
           <a:stretch>
             <a:fillRect/>
           </a:stretch>
         </p:blipFill>
         <p:spPr>
           <a:xfrm>
-            <a:off x="6434137" y="2883694"/>
-            <a:ext cx="4581525" cy="2390775"/>
-          </a:xfrm>
+            <a:off x="5954486" y="3566633"/>
+            <a:ext cx="6096000" cy="1207876"/>
+          </a:xfrm>
+          <a:prstGeom prst="rect">
+            <a:avLst/>
+          </a:prstGeom>
+        </p:spPr>
+      </p:pic>
+      <p:pic>
+        <p:nvPicPr>
+          <p:cNvPr id="8" name="Picture 7" descr="Graphical user interface, text, application&#10;&#10;Description automatically generated">
+            <a:extLst>
+              <a:ext uri="{FF2B5EF4-FFF2-40B4-BE49-F238E27FC236}">
+                <a16:creationId xmlns:a16="http://schemas.microsoft.com/office/drawing/2014/main" id="{294DE0BA-03BD-4809-9E7A-FCD136C16241}"/>
+              </a:ext>
+            </a:extLst>
+          </p:cNvPr>
+          <p:cNvPicPr>
+            <a:picLocks noChangeAspect="1"/>
+          </p:cNvPicPr>
+          <p:nvPr/>
+        </p:nvPicPr>
+        <p:blipFill>
+          <a:blip r:embed="rId4"/>
+          <a:stretch>
+            <a:fillRect/>
+          </a:stretch>
+        </p:blipFill>
+        <p:spPr>
+          <a:xfrm>
+            <a:off x="6937654" y="4821833"/>
+            <a:ext cx="4129664" cy="1047896"/>
+          </a:xfrm>
+          <a:prstGeom prst="rect">
+            <a:avLst/>
+          </a:prstGeom>
         </p:spPr>
       </p:pic>
     </p:spTree>
     <p:extLst>
       <p:ext uri="{BB962C8B-B14F-4D97-AF65-F5344CB8AC3E}">
-        <p14:creationId xmlns:p14="http://schemas.microsoft.com/office/powerpoint/2010/main" val="980565988"/>
+        <p14:creationId xmlns:p14="http://schemas.microsoft.com/office/powerpoint/2010/main" val="2517951660"/>
       </p:ext>
     </p:extLst>
   </p:cSld>
@@ -6751,6 +7119,156 @@
           <p:cNvPr id="2" name="Title 1">
             <a:extLst>
               <a:ext uri="{FF2B5EF4-FFF2-40B4-BE49-F238E27FC236}">
+                <a16:creationId xmlns:a16="http://schemas.microsoft.com/office/drawing/2014/main" id="{6ACE79EA-35B1-4D54-B1D0-761AFA3569E8}"/>
+              </a:ext>
+            </a:extLst>
+          </p:cNvPr>
+          <p:cNvSpPr>
+            <a:spLocks noGrp="1"/>
+          </p:cNvSpPr>
+          <p:nvPr>
+            <p:ph type="title"/>
+          </p:nvPr>
+        </p:nvSpPr>
+        <p:spPr/>
+        <p:txBody>
+          <a:bodyPr/>
+          <a:lstStyle/>
+          <a:p>
+            <a:r>
+              <a:rPr lang="en-US" cap="none" dirty="0"/>
+              <a:t>Implementation</a:t>
+            </a:r>
+          </a:p>
+        </p:txBody>
+      </p:sp>
+      <p:sp>
+        <p:nvSpPr>
+          <p:cNvPr id="3" name="Content Placeholder 2">
+            <a:extLst>
+              <a:ext uri="{FF2B5EF4-FFF2-40B4-BE49-F238E27FC236}">
+                <a16:creationId xmlns:a16="http://schemas.microsoft.com/office/drawing/2014/main" id="{3C07D08A-9281-44CD-8A5B-84CCEE0BAFD9}"/>
+              </a:ext>
+            </a:extLst>
+          </p:cNvPr>
+          <p:cNvSpPr>
+            <a:spLocks noGrp="1"/>
+          </p:cNvSpPr>
+          <p:nvPr>
+            <p:ph sz="quarter" idx="13"/>
+          </p:nvPr>
+        </p:nvSpPr>
+        <p:spPr/>
+        <p:txBody>
+          <a:bodyPr>
+            <a:normAutofit/>
+          </a:bodyPr>
+          <a:lstStyle/>
+          <a:p>
+            <a:r>
+              <a:rPr lang="en-US" cap="none" dirty="0"/>
+              <a:t>Written in Java</a:t>
+            </a:r>
+          </a:p>
+          <a:p>
+            <a:r>
+              <a:rPr lang="en-US" cap="none" dirty="0"/>
+              <a:t>GUI consists of three windows, with only one being displayed at a time</a:t>
+            </a:r>
+          </a:p>
+          <a:p>
+            <a:pPr lvl="1"/>
+            <a:r>
+              <a:rPr lang="en-US" cap="none" dirty="0"/>
+              <a:t>Month view window</a:t>
+            </a:r>
+          </a:p>
+          <a:p>
+            <a:pPr lvl="1"/>
+            <a:r>
+              <a:rPr lang="en-US" cap="none" dirty="0"/>
+              <a:t>Day view window</a:t>
+            </a:r>
+          </a:p>
+          <a:p>
+            <a:pPr lvl="1"/>
+            <a:r>
+              <a:rPr lang="en-US" cap="none" dirty="0"/>
+              <a:t>Input window</a:t>
+            </a:r>
+          </a:p>
+          <a:p>
+            <a:r>
+              <a:rPr lang="en-US" cap="none" dirty="0"/>
+              <a:t>All the windows share a calendar which is used to store the daily consumption values</a:t>
+            </a:r>
+          </a:p>
+        </p:txBody>
+      </p:sp>
+      <p:pic>
+        <p:nvPicPr>
+          <p:cNvPr id="6" name="Content Placeholder 5" descr="Graphical user interface&#10;&#10;Description automatically generated">
+            <a:extLst>
+              <a:ext uri="{FF2B5EF4-FFF2-40B4-BE49-F238E27FC236}">
+                <a16:creationId xmlns:a16="http://schemas.microsoft.com/office/drawing/2014/main" id="{4B8373A0-B79C-4951-913B-CDF313F83752}"/>
+              </a:ext>
+            </a:extLst>
+          </p:cNvPr>
+          <p:cNvPicPr>
+            <a:picLocks noGrp="1" noChangeAspect="1"/>
+          </p:cNvPicPr>
+          <p:nvPr>
+            <p:ph sz="quarter" idx="14"/>
+          </p:nvPr>
+        </p:nvPicPr>
+        <p:blipFill>
+          <a:blip r:embed="rId2"/>
+          <a:stretch>
+            <a:fillRect/>
+          </a:stretch>
+        </p:blipFill>
+        <p:spPr>
+          <a:xfrm>
+            <a:off x="6434137" y="2883694"/>
+            <a:ext cx="4581525" cy="2390775"/>
+          </a:xfrm>
+        </p:spPr>
+      </p:pic>
+    </p:spTree>
+    <p:extLst>
+      <p:ext uri="{BB962C8B-B14F-4D97-AF65-F5344CB8AC3E}">
+        <p14:creationId xmlns:p14="http://schemas.microsoft.com/office/powerpoint/2010/main" val="980565988"/>
+      </p:ext>
+    </p:extLst>
+  </p:cSld>
+  <p:clrMapOvr>
+    <a:masterClrMapping/>
+  </p:clrMapOvr>
+</p:sld>
+</file>
+
+<file path=ppt/slides/slide6.xml><?xml version="1.0" encoding="utf-8"?>
+<p:sld xmlns:a="http://schemas.openxmlformats.org/drawingml/2006/main" xmlns:r="http://schemas.openxmlformats.org/officeDocument/2006/relationships" xmlns:p="http://schemas.openxmlformats.org/presentationml/2006/main">
+  <p:cSld>
+    <p:spTree>
+      <p:nvGrpSpPr>
+        <p:cNvPr id="1" name=""/>
+        <p:cNvGrpSpPr/>
+        <p:nvPr/>
+      </p:nvGrpSpPr>
+      <p:grpSpPr>
+        <a:xfrm>
+          <a:off x="0" y="0"/>
+          <a:ext cx="0" cy="0"/>
+          <a:chOff x="0" y="0"/>
+          <a:chExt cx="0" cy="0"/>
+        </a:xfrm>
+      </p:grpSpPr>
+      <p:sp>
+        <p:nvSpPr>
+          <p:cNvPr id="2" name="Title 1">
+            <a:extLst>
+              <a:ext uri="{FF2B5EF4-FFF2-40B4-BE49-F238E27FC236}">
                 <a16:creationId xmlns:a16="http://schemas.microsoft.com/office/drawing/2014/main" id="{4F0E9950-DDFD-498D-B64F-29F22FFC6EDF}"/>
               </a:ext>
             </a:extLst>
@@ -6767,7 +7285,10 @@
           <a:bodyPr/>
           <a:lstStyle/>
           <a:p>
-            <a:endParaRPr lang="en-US" cap="none" dirty="0"/>
+            <a:r>
+              <a:rPr lang="en-US" cap="none" dirty="0"/>
+              <a:t>Sources</a:t>
+            </a:r>
           </a:p>
         </p:txBody>
       </p:sp>
@@ -6792,6 +7313,34 @@
           <a:bodyPr/>
           <a:lstStyle/>
           <a:p>
+            <a:r>
+              <a:rPr lang="en-US" cap="none" dirty="0">
+                <a:hlinkClick r:id="rId2"/>
+              </a:rPr>
+              <a:t>https://blogs.ei.columbia.edu/2019/09/23/climate-change-impacts-water/</a:t>
+            </a:r>
+            <a:endParaRPr lang="en-US" cap="none" dirty="0"/>
+          </a:p>
+          <a:p>
+            <a:r>
+              <a:rPr lang="en-US" cap="none" dirty="0">
+                <a:hlinkClick r:id="rId3"/>
+              </a:rPr>
+              <a:t>https://www.home-water-works.org/indoor-use</a:t>
+            </a:r>
+            <a:endParaRPr lang="en-US" cap="none" dirty="0"/>
+          </a:p>
+          <a:p>
+            <a:r>
+              <a:rPr lang="en-US" cap="none">
+                <a:hlinkClick r:id="rId4"/>
+              </a:rPr>
+              <a:t>https://www.whirlpool.com/blog/washers-and-dryers/he-washing-machine-water-usage.html</a:t>
+            </a:r>
+            <a:r>
+              <a:rPr lang="en-US" cap="none"/>
+              <a:t> </a:t>
+            </a:r>
             <a:endParaRPr lang="en-US" cap="none" dirty="0"/>
           </a:p>
         </p:txBody>
@@ -6799,7 +7348,7 @@
     </p:spTree>
     <p:extLst>
       <p:ext uri="{BB962C8B-B14F-4D97-AF65-F5344CB8AC3E}">
-        <p14:creationId xmlns:p14="http://schemas.microsoft.com/office/powerpoint/2010/main" val="2185485672"/>
+        <p14:creationId xmlns:p14="http://schemas.microsoft.com/office/powerpoint/2010/main" val="2367260284"/>
       </p:ext>
     </p:extLst>
   </p:cSld>

</xml_diff>